<commit_message>
algumas modificações no script e apresentação.
</commit_message>
<xml_diff>
--- a/Estudo/Orientação -  Agrupamento.pptx
+++ b/Estudo/Orientação -  Agrupamento.pptx
@@ -267,7 +267,7 @@
           <a:p>
             <a:fld id="{44489D64-8DD2-4A0D-83EA-AE22700CC2AC}" type="datetimeFigureOut">
               <a:rPr lang="pt-BR" smtClean="0"/>
-              <a:t>31/07/2018</a:t>
+              <a:t>01/08/2018</a:t>
             </a:fld>
             <a:endParaRPr lang="pt-BR"/>
           </a:p>
@@ -437,7 +437,7 @@
           <a:p>
             <a:fld id="{44489D64-8DD2-4A0D-83EA-AE22700CC2AC}" type="datetimeFigureOut">
               <a:rPr lang="pt-BR" smtClean="0"/>
-              <a:t>31/07/2018</a:t>
+              <a:t>01/08/2018</a:t>
             </a:fld>
             <a:endParaRPr lang="pt-BR"/>
           </a:p>
@@ -617,7 +617,7 @@
           <a:p>
             <a:fld id="{44489D64-8DD2-4A0D-83EA-AE22700CC2AC}" type="datetimeFigureOut">
               <a:rPr lang="pt-BR" smtClean="0"/>
-              <a:t>31/07/2018</a:t>
+              <a:t>01/08/2018</a:t>
             </a:fld>
             <a:endParaRPr lang="pt-BR"/>
           </a:p>
@@ -787,7 +787,7 @@
           <a:p>
             <a:fld id="{44489D64-8DD2-4A0D-83EA-AE22700CC2AC}" type="datetimeFigureOut">
               <a:rPr lang="pt-BR" smtClean="0"/>
-              <a:t>31/07/2018</a:t>
+              <a:t>01/08/2018</a:t>
             </a:fld>
             <a:endParaRPr lang="pt-BR"/>
           </a:p>
@@ -1033,7 +1033,7 @@
           <a:p>
             <a:fld id="{44489D64-8DD2-4A0D-83EA-AE22700CC2AC}" type="datetimeFigureOut">
               <a:rPr lang="pt-BR" smtClean="0"/>
-              <a:t>31/07/2018</a:t>
+              <a:t>01/08/2018</a:t>
             </a:fld>
             <a:endParaRPr lang="pt-BR"/>
           </a:p>
@@ -1265,7 +1265,7 @@
           <a:p>
             <a:fld id="{44489D64-8DD2-4A0D-83EA-AE22700CC2AC}" type="datetimeFigureOut">
               <a:rPr lang="pt-BR" smtClean="0"/>
-              <a:t>31/07/2018</a:t>
+              <a:t>01/08/2018</a:t>
             </a:fld>
             <a:endParaRPr lang="pt-BR"/>
           </a:p>
@@ -1632,7 +1632,7 @@
           <a:p>
             <a:fld id="{44489D64-8DD2-4A0D-83EA-AE22700CC2AC}" type="datetimeFigureOut">
               <a:rPr lang="pt-BR" smtClean="0"/>
-              <a:t>31/07/2018</a:t>
+              <a:t>01/08/2018</a:t>
             </a:fld>
             <a:endParaRPr lang="pt-BR"/>
           </a:p>
@@ -1750,7 +1750,7 @@
           <a:p>
             <a:fld id="{44489D64-8DD2-4A0D-83EA-AE22700CC2AC}" type="datetimeFigureOut">
               <a:rPr lang="pt-BR" smtClean="0"/>
-              <a:t>31/07/2018</a:t>
+              <a:t>01/08/2018</a:t>
             </a:fld>
             <a:endParaRPr lang="pt-BR"/>
           </a:p>
@@ -1845,7 +1845,7 @@
           <a:p>
             <a:fld id="{44489D64-8DD2-4A0D-83EA-AE22700CC2AC}" type="datetimeFigureOut">
               <a:rPr lang="pt-BR" smtClean="0"/>
-              <a:t>31/07/2018</a:t>
+              <a:t>01/08/2018</a:t>
             </a:fld>
             <a:endParaRPr lang="pt-BR"/>
           </a:p>
@@ -2122,7 +2122,7 @@
           <a:p>
             <a:fld id="{44489D64-8DD2-4A0D-83EA-AE22700CC2AC}" type="datetimeFigureOut">
               <a:rPr lang="pt-BR" smtClean="0"/>
-              <a:t>31/07/2018</a:t>
+              <a:t>01/08/2018</a:t>
             </a:fld>
             <a:endParaRPr lang="pt-BR"/>
           </a:p>
@@ -2375,7 +2375,7 @@
           <a:p>
             <a:fld id="{44489D64-8DD2-4A0D-83EA-AE22700CC2AC}" type="datetimeFigureOut">
               <a:rPr lang="pt-BR" smtClean="0"/>
-              <a:t>31/07/2018</a:t>
+              <a:t>01/08/2018</a:t>
             </a:fld>
             <a:endParaRPr lang="pt-BR"/>
           </a:p>
@@ -2588,7 +2588,7 @@
           <a:p>
             <a:fld id="{44489D64-8DD2-4A0D-83EA-AE22700CC2AC}" type="datetimeFigureOut">
               <a:rPr lang="pt-BR" smtClean="0"/>
-              <a:t>31/07/2018</a:t>
+              <a:t>01/08/2018</a:t>
             </a:fld>
             <a:endParaRPr lang="pt-BR"/>
           </a:p>
@@ -3831,6 +3831,13 @@
   <p:clrMapOvr>
     <a:masterClrMapping/>
   </p:clrMapOvr>
+  <p:timing>
+    <p:tnLst>
+      <p:par>
+        <p:cTn id="1" dur="indefinite" restart="never" nodeType="tmRoot"/>
+      </p:par>
+    </p:tnLst>
+  </p:timing>
 </p:sld>
 </file>
 
@@ -3889,6 +3896,13 @@
   <p:clrMapOvr>
     <a:masterClrMapping/>
   </p:clrMapOvr>
+  <p:timing>
+    <p:tnLst>
+      <p:par>
+        <p:cTn id="1" dur="indefinite" restart="never" nodeType="tmRoot"/>
+      </p:par>
+    </p:tnLst>
+  </p:timing>
 </p:sld>
 </file>
 
@@ -4023,6 +4037,13 @@
   <p:clrMapOvr>
     <a:masterClrMapping/>
   </p:clrMapOvr>
+  <p:timing>
+    <p:tnLst>
+      <p:par>
+        <p:cTn id="1" dur="indefinite" restart="never" nodeType="tmRoot"/>
+      </p:par>
+    </p:tnLst>
+  </p:timing>
 </p:sld>
 </file>
 
@@ -4110,7 +4131,7 @@
       </p:grpSpPr>
       <p:pic>
         <p:nvPicPr>
-          <p:cNvPr id="4" name="Espaço Reservado para Conteúdo 3"/>
+          <p:cNvPr id="5" name="Espaço Reservado para Conteúdo 4" descr="Recorte de Tela"/>
           <p:cNvPicPr>
             <a:picLocks noGrp="1" noChangeAspect="1"/>
           </p:cNvPicPr>
@@ -4119,15 +4140,42 @@
           </p:nvPr>
         </p:nvPicPr>
         <p:blipFill>
-          <a:blip r:embed="rId2"/>
+          <a:blip r:embed="rId2">
+            <a:extLst>
+              <a:ext uri="{28A0092B-C50C-407E-A947-70E740481C1C}">
+                <a14:useLocalDpi xmlns:a14="http://schemas.microsoft.com/office/drawing/2010/main" val="0"/>
+              </a:ext>
+            </a:extLst>
+          </a:blip>
           <a:stretch>
             <a:fillRect/>
           </a:stretch>
         </p:blipFill>
         <p:spPr>
           <a:xfrm>
-            <a:off x="1079500" y="419100"/>
-            <a:ext cx="10274300" cy="5834063"/>
+            <a:off x="387097" y="1257300"/>
+            <a:ext cx="5040856" cy="3873500"/>
+          </a:xfrm>
+        </p:spPr>
+      </p:pic>
+      <p:pic>
+        <p:nvPicPr>
+          <p:cNvPr id="3" name="Imagem 2"/>
+          <p:cNvPicPr>
+            <a:picLocks noChangeAspect="1"/>
+          </p:cNvPicPr>
+          <p:nvPr/>
+        </p:nvPicPr>
+        <p:blipFill>
+          <a:blip r:embed="rId3"/>
+          <a:stretch>
+            <a:fillRect/>
+          </a:stretch>
+        </p:blipFill>
+        <p:spPr>
+          <a:xfrm>
+            <a:off x="5057867" y="1257300"/>
+            <a:ext cx="7134133" cy="4454307"/>
           </a:xfrm>
           <a:prstGeom prst="rect">
             <a:avLst/>
@@ -4212,7 +4260,7 @@
       </p:sp>
       <p:pic>
         <p:nvPicPr>
-          <p:cNvPr id="5" name="Espaço Reservado para Conteúdo 4"/>
+          <p:cNvPr id="6" name="Espaço Reservado para Conteúdo 5" descr="Recorte de Tela"/>
           <p:cNvPicPr>
             <a:picLocks noGrp="1" noChangeAspect="1"/>
           </p:cNvPicPr>
@@ -4221,15 +4269,42 @@
           </p:nvPr>
         </p:nvPicPr>
         <p:blipFill>
-          <a:blip r:embed="rId2"/>
+          <a:blip r:embed="rId2">
+            <a:extLst>
+              <a:ext uri="{28A0092B-C50C-407E-A947-70E740481C1C}">
+                <a14:useLocalDpi xmlns:a14="http://schemas.microsoft.com/office/drawing/2010/main" val="0"/>
+              </a:ext>
+            </a:extLst>
+          </a:blip>
           <a:stretch>
             <a:fillRect/>
           </a:stretch>
         </p:blipFill>
         <p:spPr>
           <a:xfrm>
-            <a:off x="1637724" y="1381124"/>
-            <a:ext cx="9150119" cy="4943476"/>
+            <a:off x="936354" y="1816643"/>
+            <a:ext cx="4905645" cy="4543159"/>
+          </a:xfrm>
+        </p:spPr>
+      </p:pic>
+      <p:pic>
+        <p:nvPicPr>
+          <p:cNvPr id="4" name="Imagem 3"/>
+          <p:cNvPicPr>
+            <a:picLocks noChangeAspect="1"/>
+          </p:cNvPicPr>
+          <p:nvPr/>
+        </p:nvPicPr>
+        <p:blipFill>
+          <a:blip r:embed="rId3"/>
+          <a:stretch>
+            <a:fillRect/>
+          </a:stretch>
+        </p:blipFill>
+        <p:spPr>
+          <a:xfrm>
+            <a:off x="5717269" y="1816643"/>
+            <a:ext cx="6474732" cy="4042600"/>
           </a:xfrm>
           <a:prstGeom prst="rect">
             <a:avLst/>
@@ -4830,11 +4905,7 @@
             </a:r>
             <a:r>
               <a:rPr lang="pt-BR" sz="2400" dirty="0" smtClean="0"/>
-              <a:t>, </a:t>
-            </a:r>
-            <a:r>
-              <a:rPr lang="pt-BR" sz="2400" dirty="0" smtClean="0"/>
-              <a:t>o gráfico também muda - </a:t>
+              <a:t>, o gráfico também muda - </a:t>
             </a:r>
             <a:r>
               <a:rPr lang="pt-BR" sz="2400" dirty="0" err="1" smtClean="0"/>
@@ -4842,31 +4913,7 @@
             </a:r>
             <a:r>
               <a:rPr lang="pt-BR" sz="2400" dirty="0" smtClean="0"/>
-              <a:t>(200). O que </a:t>
-            </a:r>
-            <a:r>
-              <a:rPr lang="pt-BR" sz="2400" dirty="0" smtClean="0"/>
-              <a:t>pode acontecer </a:t>
-            </a:r>
-            <a:r>
-              <a:rPr lang="pt-BR" sz="2400" dirty="0" smtClean="0"/>
-              <a:t>é alteração na ordem dos </a:t>
-            </a:r>
-            <a:r>
-              <a:rPr lang="pt-BR" sz="2400" dirty="0" smtClean="0"/>
-              <a:t>grupos, </a:t>
-            </a:r>
-            <a:r>
-              <a:rPr lang="pt-BR" sz="2400" dirty="0" smtClean="0"/>
-              <a:t>em comparação </a:t>
-            </a:r>
-            <a:r>
-              <a:rPr lang="pt-BR" sz="2400" dirty="0" smtClean="0"/>
-              <a:t>com a </a:t>
-            </a:r>
-            <a:r>
-              <a:rPr lang="pt-BR" sz="2400" dirty="0" smtClean="0"/>
-              <a:t>imagem anterior. </a:t>
+              <a:t>(200). O que pode acontecer é alteração na ordem dos grupos, em comparação com a imagem anterior. </a:t>
             </a:r>
             <a:endParaRPr lang="pt-BR" sz="2400" dirty="0"/>
           </a:p>
@@ -4950,8 +4997,38 @@
         </p:blipFill>
         <p:spPr>
           <a:xfrm>
-            <a:off x="1589348" y="838200"/>
+            <a:off x="3888048" y="1673298"/>
             <a:ext cx="8303952" cy="5184702"/>
+          </a:xfrm>
+          <a:prstGeom prst="rect">
+            <a:avLst/>
+          </a:prstGeom>
+        </p:spPr>
+      </p:pic>
+      <p:pic>
+        <p:nvPicPr>
+          <p:cNvPr id="2" name="Imagem 1" descr="Recorte de Tela"/>
+          <p:cNvPicPr>
+            <a:picLocks noChangeAspect="1"/>
+          </p:cNvPicPr>
+          <p:nvPr/>
+        </p:nvPicPr>
+        <p:blipFill>
+          <a:blip r:embed="rId3">
+            <a:extLst>
+              <a:ext uri="{28A0092B-C50C-407E-A947-70E740481C1C}">
+                <a14:useLocalDpi xmlns:a14="http://schemas.microsoft.com/office/drawing/2010/main" val="0"/>
+              </a:ext>
+            </a:extLst>
+          </a:blip>
+          <a:stretch>
+            <a:fillRect/>
+          </a:stretch>
+        </p:blipFill>
+        <p:spPr>
+          <a:xfrm>
+            <a:off x="102918" y="0"/>
+            <a:ext cx="4392882" cy="2809275"/>
           </a:xfrm>
           <a:prstGeom prst="rect">
             <a:avLst/>
@@ -4968,6 +5045,13 @@
   <p:clrMapOvr>
     <a:masterClrMapping/>
   </p:clrMapOvr>
+  <p:timing>
+    <p:tnLst>
+      <p:par>
+        <p:cTn id="1" dur="indefinite" restart="never" nodeType="tmRoot"/>
+      </p:par>
+    </p:tnLst>
+  </p:timing>
 </p:sld>
 </file>
 

</xml_diff>